<commit_message>
sending stuff before branching to the cut-away-branch
</commit_message>
<xml_diff>
--- a/docs/SystemComponentDiagram.pptx
+++ b/docs/SystemComponentDiagram.pptx
@@ -3661,8 +3661,9 @@
             <a:pPr algn="ctr"/>
             <a:r>
               <a:rPr lang="en-US" dirty="0" smtClean="0"/>
-              <a:t>MD</a:t>
-            </a:r>
+              <a:t>SG</a:t>
+            </a:r>
+            <a:endParaRPr lang="en-US" dirty="0" smtClean="0"/>
           </a:p>
         </p:txBody>
       </p:sp>

</xml_diff>